<commit_message>
Updated XO Skin Web Application Project Plan.pptx
</commit_message>
<xml_diff>
--- a/ProjectDocuments/ProjectManagement/XO Skin Web Application Project Plan.pptx
+++ b/ProjectDocuments/ProjectManagement/XO Skin Web Application Project Plan.pptx
@@ -124,7 +124,7 @@
 <file path=ppt/revisionInfo.xml><?xml version="1.0" encoding="utf-8"?>
 <p1510:revInfo xmlns:a="http://schemas.openxmlformats.org/drawingml/2006/main" xmlns:r="http://schemas.openxmlformats.org/officeDocument/2006/relationships" xmlns:p1510="http://schemas.microsoft.com/office/powerpoint/2015/10/main">
   <p1510:revLst>
-    <p1510:client id="{240A4633-C63A-4676-934A-3396ABF03840}" v="640" dt="2021-07-27T15:27:54.815"/>
+    <p1510:client id="{240A4633-C63A-4676-934A-3396ABF03840}" v="1239" dt="2021-07-27T18:43:54.877"/>
     <p1510:client id="{83F144CE-0100-40C4-8366-84F3469B3331}" v="2481" dt="2021-07-27T00:01:47.871"/>
     <p1510:client id="{AA01E81F-2657-4B73-9771-9FE649AD8155}" v="2263" dt="2021-07-27T14:23:30.438"/>
   </p1510:revLst>
@@ -136,7 +136,7 @@
   <pc:docChgLst>
     <pc:chgData name="Rafael Pérez" userId="60bc72bacf3550ec" providerId="Windows Live" clId="Web-{240A4633-C63A-4676-934A-3396ABF03840}"/>
     <pc:docChg chg="addSld modSld">
-      <pc:chgData name="Rafael Pérez" userId="60bc72bacf3550ec" providerId="Windows Live" clId="Web-{240A4633-C63A-4676-934A-3396ABF03840}" dt="2021-07-27T15:27:49.784" v="383" actId="20577"/>
+      <pc:chgData name="Rafael Pérez" userId="60bc72bacf3550ec" providerId="Windows Live" clId="Web-{240A4633-C63A-4676-934A-3396ABF03840}" dt="2021-07-27T18:43:54.877" v="743" actId="20577"/>
       <pc:docMkLst>
         <pc:docMk/>
       </pc:docMkLst>
@@ -156,13 +156,13 @@
         </pc:spChg>
       </pc:sldChg>
       <pc:sldChg chg="modSp">
-        <pc:chgData name="Rafael Pérez" userId="60bc72bacf3550ec" providerId="Windows Live" clId="Web-{240A4633-C63A-4676-934A-3396ABF03840}" dt="2021-07-27T15:06:18.994" v="340" actId="20577"/>
+        <pc:chgData name="Rafael Pérez" userId="60bc72bacf3550ec" providerId="Windows Live" clId="Web-{240A4633-C63A-4676-934A-3396ABF03840}" dt="2021-07-27T17:50:45.210" v="422" actId="20577"/>
         <pc:sldMkLst>
           <pc:docMk/>
           <pc:sldMk cId="1157816767" sldId="257"/>
         </pc:sldMkLst>
         <pc:spChg chg="mod">
-          <ac:chgData name="Rafael Pérez" userId="60bc72bacf3550ec" providerId="Windows Live" clId="Web-{240A4633-C63A-4676-934A-3396ABF03840}" dt="2021-07-27T15:06:18.994" v="340" actId="20577"/>
+          <ac:chgData name="Rafael Pérez" userId="60bc72bacf3550ec" providerId="Windows Live" clId="Web-{240A4633-C63A-4676-934A-3396ABF03840}" dt="2021-07-27T17:50:45.210" v="422" actId="20577"/>
           <ac:spMkLst>
             <pc:docMk/>
             <pc:sldMk cId="1157816767" sldId="257"/>
@@ -171,13 +171,13 @@
         </pc:spChg>
       </pc:sldChg>
       <pc:sldChg chg="addSp delSp modSp">
-        <pc:chgData name="Rafael Pérez" userId="60bc72bacf3550ec" providerId="Windows Live" clId="Web-{240A4633-C63A-4676-934A-3396ABF03840}" dt="2021-07-27T15:07:26.527" v="341" actId="14100"/>
+        <pc:chgData name="Rafael Pérez" userId="60bc72bacf3550ec" providerId="Windows Live" clId="Web-{240A4633-C63A-4676-934A-3396ABF03840}" dt="2021-07-27T18:43:54.877" v="743" actId="20577"/>
         <pc:sldMkLst>
           <pc:docMk/>
           <pc:sldMk cId="2596846953" sldId="258"/>
         </pc:sldMkLst>
         <pc:spChg chg="mod">
-          <ac:chgData name="Rafael Pérez" userId="60bc72bacf3550ec" providerId="Windows Live" clId="Web-{240A4633-C63A-4676-934A-3396ABF03840}" dt="2021-07-27T14:59:48.737" v="323" actId="20577"/>
+          <ac:chgData name="Rafael Pérez" userId="60bc72bacf3550ec" providerId="Windows Live" clId="Web-{240A4633-C63A-4676-934A-3396ABF03840}" dt="2021-07-27T18:43:54.877" v="743" actId="20577"/>
           <ac:spMkLst>
             <pc:docMk/>
             <pc:sldMk cId="2596846953" sldId="258"/>
@@ -225,13 +225,13 @@
         </pc:spChg>
       </pc:sldChg>
       <pc:sldChg chg="modSp">
-        <pc:chgData name="Rafael Pérez" userId="60bc72bacf3550ec" providerId="Windows Live" clId="Web-{240A4633-C63A-4676-934A-3396ABF03840}" dt="2021-07-27T14:28:49.531" v="13" actId="20577"/>
+        <pc:chgData name="Rafael Pérez" userId="60bc72bacf3550ec" providerId="Windows Live" clId="Web-{240A4633-C63A-4676-934A-3396ABF03840}" dt="2021-07-27T18:16:20.611" v="725" actId="20577"/>
         <pc:sldMkLst>
           <pc:docMk/>
           <pc:sldMk cId="592595824" sldId="262"/>
         </pc:sldMkLst>
         <pc:spChg chg="mod">
-          <ac:chgData name="Rafael Pérez" userId="60bc72bacf3550ec" providerId="Windows Live" clId="Web-{240A4633-C63A-4676-934A-3396ABF03840}" dt="2021-07-27T14:28:49.531" v="13" actId="20577"/>
+          <ac:chgData name="Rafael Pérez" userId="60bc72bacf3550ec" providerId="Windows Live" clId="Web-{240A4633-C63A-4676-934A-3396ABF03840}" dt="2021-07-27T18:16:20.611" v="725" actId="20577"/>
           <ac:spMkLst>
             <pc:docMk/>
             <pc:sldMk cId="592595824" sldId="262"/>
@@ -239,14 +239,22 @@
           </ac:spMkLst>
         </pc:spChg>
       </pc:sldChg>
-      <pc:sldChg chg="modSp">
-        <pc:chgData name="Rafael Pérez" userId="60bc72bacf3550ec" providerId="Windows Live" clId="Web-{240A4633-C63A-4676-934A-3396ABF03840}" dt="2021-07-27T14:54:25.966" v="256" actId="20577"/>
+      <pc:sldChg chg="addSp delSp modSp">
+        <pc:chgData name="Rafael Pérez" userId="60bc72bacf3550ec" providerId="Windows Live" clId="Web-{240A4633-C63A-4676-934A-3396ABF03840}" dt="2021-07-27T18:04:57.929" v="724" actId="20577"/>
         <pc:sldMkLst>
           <pc:docMk/>
           <pc:sldMk cId="32516801" sldId="264"/>
         </pc:sldMkLst>
+        <pc:spChg chg="add del">
+          <ac:chgData name="Rafael Pérez" userId="60bc72bacf3550ec" providerId="Windows Live" clId="Web-{240A4633-C63A-4676-934A-3396ABF03840}" dt="2021-07-27T17:55:05.418" v="486"/>
+          <ac:spMkLst>
+            <pc:docMk/>
+            <pc:sldMk cId="32516801" sldId="264"/>
+            <ac:spMk id="3" creationId="{CEE45D90-3D03-4750-B694-71DEA73B2FD2}"/>
+          </ac:spMkLst>
+        </pc:spChg>
         <pc:spChg chg="mod">
-          <ac:chgData name="Rafael Pérez" userId="60bc72bacf3550ec" providerId="Windows Live" clId="Web-{240A4633-C63A-4676-934A-3396ABF03840}" dt="2021-07-27T14:50:16.320" v="189" actId="20577"/>
+          <ac:chgData name="Rafael Pérez" userId="60bc72bacf3550ec" providerId="Windows Live" clId="Web-{240A4633-C63A-4676-934A-3396ABF03840}" dt="2021-07-27T17:58:52" v="638" actId="20577"/>
           <ac:spMkLst>
             <pc:docMk/>
             <pc:sldMk cId="32516801" sldId="264"/>
@@ -254,15 +262,23 @@
           </ac:spMkLst>
         </pc:spChg>
         <pc:spChg chg="mod">
-          <ac:chgData name="Rafael Pérez" userId="60bc72bacf3550ec" providerId="Windows Live" clId="Web-{240A4633-C63A-4676-934A-3396ABF03840}" dt="2021-07-27T14:50:22.617" v="195" actId="20577"/>
+          <ac:chgData name="Rafael Pérez" userId="60bc72bacf3550ec" providerId="Windows Live" clId="Web-{240A4633-C63A-4676-934A-3396ABF03840}" dt="2021-07-27T18:03:32.177" v="717" actId="20577"/>
           <ac:spMkLst>
             <pc:docMk/>
             <pc:sldMk cId="32516801" sldId="264"/>
             <ac:spMk id="5" creationId="{E4318166-6447-4A8E-8ADE-170B3B3B2BA8}"/>
           </ac:spMkLst>
         </pc:spChg>
+        <pc:spChg chg="add mod">
+          <ac:chgData name="Rafael Pérez" userId="60bc72bacf3550ec" providerId="Windows Live" clId="Web-{240A4633-C63A-4676-934A-3396ABF03840}" dt="2021-07-27T18:02:17.801" v="704" actId="20577"/>
+          <ac:spMkLst>
+            <pc:docMk/>
+            <pc:sldMk cId="32516801" sldId="264"/>
+            <ac:spMk id="6" creationId="{B8799499-7E74-42F6-AFCF-521483CBC828}"/>
+          </ac:spMkLst>
+        </pc:spChg>
         <pc:spChg chg="mod">
-          <ac:chgData name="Rafael Pérez" userId="60bc72bacf3550ec" providerId="Windows Live" clId="Web-{240A4633-C63A-4676-934A-3396ABF03840}" dt="2021-07-27T14:54:25.966" v="256" actId="20577"/>
+          <ac:chgData name="Rafael Pérez" userId="60bc72bacf3550ec" providerId="Windows Live" clId="Web-{240A4633-C63A-4676-934A-3396ABF03840}" dt="2021-07-27T18:02:24.848" v="706" actId="20577"/>
           <ac:spMkLst>
             <pc:docMk/>
             <pc:sldMk cId="32516801" sldId="264"/>
@@ -270,7 +286,7 @@
           </ac:spMkLst>
         </pc:spChg>
         <pc:spChg chg="mod">
-          <ac:chgData name="Rafael Pérez" userId="60bc72bacf3550ec" providerId="Windows Live" clId="Web-{240A4633-C63A-4676-934A-3396ABF03840}" dt="2021-07-27T14:54:23.387" v="255" actId="20577"/>
+          <ac:chgData name="Rafael Pérez" userId="60bc72bacf3550ec" providerId="Windows Live" clId="Web-{240A4633-C63A-4676-934A-3396ABF03840}" dt="2021-07-27T18:04:05.787" v="718" actId="20577"/>
           <ac:spMkLst>
             <pc:docMk/>
             <pc:sldMk cId="32516801" sldId="264"/>
@@ -278,7 +294,7 @@
           </ac:spMkLst>
         </pc:spChg>
         <pc:spChg chg="mod">
-          <ac:chgData name="Rafael Pérez" userId="60bc72bacf3550ec" providerId="Windows Live" clId="Web-{240A4633-C63A-4676-934A-3396ABF03840}" dt="2021-07-27T14:49:40.007" v="146" actId="14100"/>
+          <ac:chgData name="Rafael Pérez" userId="60bc72bacf3550ec" providerId="Windows Live" clId="Web-{240A4633-C63A-4676-934A-3396ABF03840}" dt="2021-07-27T18:04:15.506" v="719" actId="20577"/>
           <ac:spMkLst>
             <pc:docMk/>
             <pc:sldMk cId="32516801" sldId="264"/>
@@ -286,7 +302,31 @@
           </ac:spMkLst>
         </pc:spChg>
         <pc:spChg chg="mod">
-          <ac:chgData name="Rafael Pérez" userId="60bc72bacf3550ec" providerId="Windows Live" clId="Web-{240A4633-C63A-4676-934A-3396ABF03840}" dt="2021-07-27T14:49:58.742" v="165" actId="20577"/>
+          <ac:chgData name="Rafael Pérez" userId="60bc72bacf3550ec" providerId="Windows Live" clId="Web-{240A4633-C63A-4676-934A-3396ABF03840}" dt="2021-07-27T17:59:00.844" v="643" actId="20577"/>
+          <ac:spMkLst>
+            <pc:docMk/>
+            <pc:sldMk cId="32516801" sldId="264"/>
+            <ac:spMk id="10" creationId="{6E5F129E-C876-400A-BCF7-F04B30014BAB}"/>
+          </ac:spMkLst>
+        </pc:spChg>
+        <pc:spChg chg="mod">
+          <ac:chgData name="Rafael Pérez" userId="60bc72bacf3550ec" providerId="Windows Live" clId="Web-{240A4633-C63A-4676-934A-3396ABF03840}" dt="2021-07-27T17:59:02.391" v="644" actId="20577"/>
+          <ac:spMkLst>
+            <pc:docMk/>
+            <pc:sldMk cId="32516801" sldId="264"/>
+            <ac:spMk id="11" creationId="{A817EB00-C13D-47C2-BB64-5C345D32804A}"/>
+          </ac:spMkLst>
+        </pc:spChg>
+        <pc:spChg chg="mod">
+          <ac:chgData name="Rafael Pérez" userId="60bc72bacf3550ec" providerId="Windows Live" clId="Web-{240A4633-C63A-4676-934A-3396ABF03840}" dt="2021-07-27T17:59:04.844" v="646" actId="20577"/>
+          <ac:spMkLst>
+            <pc:docMk/>
+            <pc:sldMk cId="32516801" sldId="264"/>
+            <ac:spMk id="12" creationId="{0F3D33B1-FA37-4059-8839-EF250086F9DB}"/>
+          </ac:spMkLst>
+        </pc:spChg>
+        <pc:spChg chg="mod">
+          <ac:chgData name="Rafael Pérez" userId="60bc72bacf3550ec" providerId="Windows Live" clId="Web-{240A4633-C63A-4676-934A-3396ABF03840}" dt="2021-07-27T18:04:29.412" v="720" actId="20577"/>
           <ac:spMkLst>
             <pc:docMk/>
             <pc:sldMk cId="32516801" sldId="264"/>
@@ -294,7 +334,7 @@
           </ac:spMkLst>
         </pc:spChg>
         <pc:spChg chg="mod">
-          <ac:chgData name="Rafael Pérez" userId="60bc72bacf3550ec" providerId="Windows Live" clId="Web-{240A4633-C63A-4676-934A-3396ABF03840}" dt="2021-07-27T14:50:09.070" v="179" actId="20577"/>
+          <ac:chgData name="Rafael Pérez" userId="60bc72bacf3550ec" providerId="Windows Live" clId="Web-{240A4633-C63A-4676-934A-3396ABF03840}" dt="2021-07-27T18:04:39.116" v="722" actId="20577"/>
           <ac:spMkLst>
             <pc:docMk/>
             <pc:sldMk cId="32516801" sldId="264"/>
@@ -302,13 +342,53 @@
           </ac:spMkLst>
         </pc:spChg>
         <pc:spChg chg="mod">
-          <ac:chgData name="Rafael Pérez" userId="60bc72bacf3550ec" providerId="Windows Live" clId="Web-{240A4633-C63A-4676-934A-3396ABF03840}" dt="2021-07-27T14:50:37.461" v="218" actId="20577"/>
+          <ac:chgData name="Rafael Pérez" userId="60bc72bacf3550ec" providerId="Windows Live" clId="Web-{240A4633-C63A-4676-934A-3396ABF03840}" dt="2021-07-27T18:04:57.929" v="724" actId="20577"/>
           <ac:spMkLst>
             <pc:docMk/>
             <pc:sldMk cId="32516801" sldId="264"/>
             <ac:spMk id="15" creationId="{643F70DB-BB15-4274-933D-74C68103E2F6}"/>
           </ac:spMkLst>
         </pc:spChg>
+        <pc:spChg chg="mod">
+          <ac:chgData name="Rafael Pérez" userId="60bc72bacf3550ec" providerId="Windows Live" clId="Web-{240A4633-C63A-4676-934A-3396ABF03840}" dt="2021-07-27T18:00:52.627" v="703" actId="20577"/>
+          <ac:spMkLst>
+            <pc:docMk/>
+            <pc:sldMk cId="32516801" sldId="264"/>
+            <ac:spMk id="20" creationId="{380DE9E3-CE7E-405F-B6BC-D1D91C8669D1}"/>
+          </ac:spMkLst>
+        </pc:spChg>
+        <pc:spChg chg="mod">
+          <ac:chgData name="Rafael Pérez" userId="60bc72bacf3550ec" providerId="Windows Live" clId="Web-{240A4633-C63A-4676-934A-3396ABF03840}" dt="2021-07-27T17:58:22.749" v="628" actId="20577"/>
+          <ac:spMkLst>
+            <pc:docMk/>
+            <pc:sldMk cId="32516801" sldId="264"/>
+            <ac:spMk id="22" creationId="{704E1B71-04BF-4F2A-98E9-F077DBCD7E98}"/>
+          </ac:spMkLst>
+        </pc:spChg>
+        <pc:cxnChg chg="mod">
+          <ac:chgData name="Rafael Pérez" userId="60bc72bacf3550ec" providerId="Windows Live" clId="Web-{240A4633-C63A-4676-934A-3396ABF03840}" dt="2021-07-27T17:53:38.369" v="475" actId="1076"/>
+          <ac:cxnSpMkLst>
+            <pc:docMk/>
+            <pc:sldMk cId="32516801" sldId="264"/>
+            <ac:cxnSpMk id="17" creationId="{F9F1375B-1A18-4C9D-A594-110F6596832A}"/>
+          </ac:cxnSpMkLst>
+        </pc:cxnChg>
+        <pc:cxnChg chg="mod">
+          <ac:chgData name="Rafael Pérez" userId="60bc72bacf3550ec" providerId="Windows Live" clId="Web-{240A4633-C63A-4676-934A-3396ABF03840}" dt="2021-07-27T17:53:38.369" v="476" actId="1076"/>
+          <ac:cxnSpMkLst>
+            <pc:docMk/>
+            <pc:sldMk cId="32516801" sldId="264"/>
+            <ac:cxnSpMk id="18" creationId="{9DDB1EC9-AE8A-49E1-8D77-FEEAC321B8FB}"/>
+          </ac:cxnSpMkLst>
+        </pc:cxnChg>
+        <pc:cxnChg chg="mod">
+          <ac:chgData name="Rafael Pérez" userId="60bc72bacf3550ec" providerId="Windows Live" clId="Web-{240A4633-C63A-4676-934A-3396ABF03840}" dt="2021-07-27T17:53:38.369" v="477" actId="1076"/>
+          <ac:cxnSpMkLst>
+            <pc:docMk/>
+            <pc:sldMk cId="32516801" sldId="264"/>
+            <ac:cxnSpMk id="19" creationId="{679F955D-913E-4FA7-9764-7047DD42ED74}"/>
+          </ac:cxnSpMkLst>
+        </pc:cxnChg>
       </pc:sldChg>
       <pc:sldChg chg="addSp delSp modSp new">
         <pc:chgData name="Rafael Pérez" userId="60bc72bacf3550ec" providerId="Windows Live" clId="Web-{240A4633-C63A-4676-934A-3396ABF03840}" dt="2021-07-27T15:27:49.784" v="383" actId="20577"/>
@@ -7083,8 +7163,8 @@
               <a:t>Product launch DATE can be from</a:t>
             </a:r>
             <a:r>
-              <a:rPr lang="en-US" b="1" dirty="0"/>
-              <a:t> MONDAY 11/1/2021 </a:t>
+              <a:rPr lang="en-US" b="1"/>
+              <a:t> Saturday 10/30/2021 </a:t>
             </a:r>
             <a:r>
               <a:rPr lang="en-US" dirty="0"/>
@@ -7126,11 +7206,11 @@
               <a:t>SOFTWARE DEVELOPMENT WORKLOAD HAS BEEN DIVIDED INTO </a:t>
             </a:r>
             <a:r>
-              <a:rPr lang="en-US" b="1" dirty="0"/>
-              <a:t>10</a:t>
-            </a:r>
-            <a:r>
-              <a:rPr lang="en-US" dirty="0"/>
+              <a:rPr lang="en-US" b="1"/>
+              <a:t>9</a:t>
+            </a:r>
+            <a:r>
+              <a:rPr lang="en-US"/>
               <a:t>, </a:t>
             </a:r>
             <a:r>
@@ -7212,8 +7292,8 @@
               <a:t>AFTER THAT, FROM SPRINTS </a:t>
             </a:r>
             <a:r>
-              <a:rPr lang="en-US" b="1" dirty="0"/>
-              <a:t>4 TO 10</a:t>
+              <a:rPr lang="en-US" b="1"/>
+              <a:t>4 TO 9</a:t>
             </a:r>
             <a:r>
               <a:rPr lang="en-US" dirty="0"/>
@@ -7236,8 +7316,8 @@
               <a:t>AFTER QA\TESTING FOR </a:t>
             </a:r>
             <a:r>
-              <a:rPr lang="en-US" b="1" dirty="0"/>
-              <a:t>SPRINT 10</a:t>
+              <a:rPr lang="en-US" b="1"/>
+              <a:t>SPRINT 9</a:t>
             </a:r>
             <a:r>
               <a:rPr lang="en-US" dirty="0"/>
@@ -7365,12 +7445,23 @@
               </a:rPr>
             </a:br>
             <a:r>
+              <a:rPr lang="en-US">
+                <a:ea typeface="+mn-lt"/>
+                <a:cs typeface="+mn-lt"/>
+              </a:rPr>
+              <a:t>AND QA/TESTING NEEDS TO BE VERY focused and </a:t>
+            </a:r>
+            <a:r>
               <a:rPr lang="en-US" dirty="0">
                 <a:ea typeface="+mn-lt"/>
                 <a:cs typeface="+mn-lt"/>
               </a:rPr>
-              <a:t>AND QA/TESTING NEEDS TO BE VERY EFFICIENT.</a:t>
-            </a:r>
+              <a:t>EFFICIENT.</a:t>
+            </a:r>
+            <a:endParaRPr lang="en-US">
+              <a:ea typeface="+mn-lt"/>
+              <a:cs typeface="+mn-lt"/>
+            </a:endParaRPr>
           </a:p>
           <a:p>
             <a:pPr>
@@ -7415,34 +7506,54 @@
               <a:t>Development/Testing ratio: </a:t>
             </a:r>
             <a:r>
+              <a:rPr lang="en-US" b="1"/>
+              <a:t>100/10.41</a:t>
+            </a:r>
+            <a:r>
+              <a:rPr lang="en-US" dirty="0"/>
+              <a:t> </a:t>
+            </a:r>
+            <a:br>
+              <a:rPr lang="en-US" dirty="0"/>
+            </a:br>
+            <a:r>
+              <a:rPr lang="en-US"/>
+              <a:t>(</a:t>
+            </a:r>
+            <a:r>
+              <a:rPr lang="en-US" i="1"/>
+              <a:t>1OO/15</a:t>
+            </a:r>
+            <a:r>
+              <a:rPr lang="en-US"/>
+              <a:t>-</a:t>
+            </a:r>
+            <a:r>
+              <a:rPr lang="en-US" i="1"/>
+              <a:t>100/35 </a:t>
+            </a:r>
+            <a:r>
+              <a:rPr lang="en-US"/>
+              <a:t>considered normal, ours is </a:t>
+            </a:r>
+            <a:r>
+              <a:rPr lang="en-US" b="1"/>
+              <a:t>slightly </a:t>
+            </a:r>
+            <a:br>
               <a:rPr lang="en-US" b="1" dirty="0"/>
-              <a:t>1/10.41</a:t>
-            </a:r>
-            <a:r>
-              <a:rPr lang="en-US" dirty="0"/>
-              <a:t> </a:t>
-            </a:r>
-            <a:br>
-              <a:rPr lang="en-US" dirty="0"/>
             </a:br>
             <a:r>
-              <a:rPr lang="en-US" dirty="0"/>
-              <a:t>(1/15-1/35 considered normal, ours is </a:t>
-            </a:r>
-            <a:r>
-              <a:rPr lang="en-US" b="1" dirty="0"/>
-              <a:t>slightly low</a:t>
-            </a:r>
-            <a:r>
-              <a:rPr lang="en-US" dirty="0"/>
-              <a:t>, </a:t>
-            </a:r>
-            <a:br>
-              <a:rPr lang="en-US" dirty="0"/>
-            </a:br>
-            <a:r>
-              <a:rPr lang="en-US" dirty="0"/>
-              <a:t>Will have to make -up with high team expertise.)</a:t>
+              <a:rPr lang="en-US" b="1"/>
+              <a:t>low</a:t>
+            </a:r>
+            <a:r>
+              <a:rPr lang="en-US"/>
+              <a:t>, Will have to make-up with high team expertise.</a:t>
+            </a:r>
+            <a:r>
+              <a:rPr lang="en-US" dirty="0"/>
+              <a:t>)</a:t>
             </a:r>
           </a:p>
           <a:p>
@@ -8140,7 +8251,15 @@
             </a:r>
             <a:r>
               <a:rPr lang="en-US" dirty="0"/>
-              <a:t> is a fixed amount of time into which you add programming </a:t>
+              <a:t> is a fixed amount of </a:t>
+            </a:r>
+            <a:r>
+              <a:rPr lang="en-US" i="1" dirty="0"/>
+              <a:t>time </a:t>
+            </a:r>
+            <a:r>
+              <a:rPr lang="en-US" dirty="0"/>
+              <a:t>into which you add programming </a:t>
             </a:r>
             <a:r>
               <a:rPr lang="en-US" b="1" dirty="0"/>
@@ -8271,7 +8390,7 @@
         </p:nvSpPr>
         <p:spPr>
           <a:xfrm>
-            <a:off x="4741863" y="4051300"/>
+            <a:off x="4741863" y="4428203"/>
             <a:ext cx="1849437" cy="912812"/>
           </a:xfrm>
           <a:prstGeom prst="roundRect">
@@ -8314,7 +8433,23 @@
             <a:pPr algn="ctr"/>
             <a:r>
               <a:rPr lang="en-US" dirty="0"/>
-              <a:t>Programming Task C (Has Issues)</a:t>
+              <a:t>Programming </a:t>
+            </a:r>
+            <a:r>
+              <a:rPr lang="en-US" b="1" dirty="0"/>
+              <a:t>Task </a:t>
+            </a:r>
+            <a:r>
+              <a:rPr lang="en-US" dirty="0"/>
+              <a:t>C (Has </a:t>
+            </a:r>
+            <a:r>
+              <a:rPr lang="en-US" b="1" dirty="0"/>
+              <a:t>Issues</a:t>
+            </a:r>
+            <a:r>
+              <a:rPr lang="en-US" dirty="0"/>
+              <a:t>)</a:t>
             </a:r>
           </a:p>
         </p:txBody>
@@ -8333,7 +8468,7 @@
         </p:nvSpPr>
         <p:spPr>
           <a:xfrm>
-            <a:off x="6884987" y="4051300"/>
+            <a:off x="6884987" y="4428203"/>
             <a:ext cx="1849437" cy="912812"/>
           </a:xfrm>
           <a:prstGeom prst="roundRect">
@@ -8375,8 +8510,24 @@
           <a:p>
             <a:pPr algn="ctr"/>
             <a:r>
-              <a:rPr lang="en-US" dirty="0"/>
-              <a:t>Programming Task D (Has Issues)</a:t>
+              <a:rPr lang="en-US"/>
+              <a:t>Testing </a:t>
+            </a:r>
+            <a:r>
+              <a:rPr lang="en-US" b="1"/>
+              <a:t>Task </a:t>
+            </a:r>
+            <a:r>
+              <a:rPr lang="en-US" dirty="0"/>
+              <a:t>D (Has </a:t>
+            </a:r>
+            <a:r>
+              <a:rPr lang="en-US" b="1" dirty="0"/>
+              <a:t>Issues</a:t>
+            </a:r>
+            <a:r>
+              <a:rPr lang="en-US" dirty="0"/>
+              <a:t>)</a:t>
             </a:r>
           </a:p>
         </p:txBody>
@@ -8395,7 +8546,7 @@
         </p:nvSpPr>
         <p:spPr>
           <a:xfrm>
-            <a:off x="4741861" y="3392487"/>
+            <a:off x="4741861" y="3769390"/>
             <a:ext cx="3992562" cy="484187"/>
           </a:xfrm>
           <a:prstGeom prst="roundRect">
@@ -8438,8 +8589,20 @@
           <a:p>
             <a:pPr algn="ctr"/>
             <a:r>
-              <a:rPr lang="en-US" dirty="0"/>
-              <a:t>Sprint 3 (Timed, Have Tasks)</a:t>
+              <a:rPr lang="en-US" b="1"/>
+              <a:t>Sprint </a:t>
+            </a:r>
+            <a:r>
+              <a:rPr lang="en-US"/>
+              <a:t>3 (Timed, has </a:t>
+            </a:r>
+            <a:r>
+              <a:rPr lang="en-US" b="1"/>
+              <a:t>Tasks</a:t>
+            </a:r>
+            <a:r>
+              <a:rPr lang="en-US"/>
+              <a:t>)</a:t>
             </a:r>
           </a:p>
         </p:txBody>
@@ -8458,7 +8621,7 @@
         </p:nvSpPr>
         <p:spPr>
           <a:xfrm>
-            <a:off x="542923" y="3392487"/>
+            <a:off x="542923" y="3769390"/>
             <a:ext cx="3992562" cy="484187"/>
           </a:xfrm>
           <a:prstGeom prst="roundRect">
@@ -8501,8 +8664,20 @@
           <a:p>
             <a:pPr algn="ctr"/>
             <a:r>
-              <a:rPr lang="en-US" dirty="0"/>
-              <a:t>Sprint 2 (Timed, Have Tasks)</a:t>
+              <a:rPr lang="en-US" b="1"/>
+              <a:t>Sprint </a:t>
+            </a:r>
+            <a:r>
+              <a:rPr lang="en-US"/>
+              <a:t>N (Timed, Has </a:t>
+            </a:r>
+            <a:r>
+              <a:rPr lang="en-US" b="1"/>
+              <a:t>Tasks</a:t>
+            </a:r>
+            <a:r>
+              <a:rPr lang="en-US" dirty="0"/>
+              <a:t>)</a:t>
             </a:r>
           </a:p>
         </p:txBody>
@@ -8521,7 +8696,7 @@
         </p:nvSpPr>
         <p:spPr>
           <a:xfrm>
-            <a:off x="8940798" y="3392487"/>
+            <a:off x="8940798" y="3769390"/>
             <a:ext cx="2825750" cy="484187"/>
           </a:xfrm>
           <a:prstGeom prst="roundRect">
@@ -8564,8 +8739,20 @@
           <a:p>
             <a:pPr algn="ctr"/>
             <a:r>
-              <a:rPr lang="en-US" dirty="0"/>
-              <a:t>Sprint 4 (Timed, Have Tasks)</a:t>
+              <a:rPr lang="en-US" b="1"/>
+              <a:t>Sprint </a:t>
+            </a:r>
+            <a:r>
+              <a:rPr lang="en-US"/>
+              <a:t>M (Timed, has </a:t>
+            </a:r>
+            <a:r>
+              <a:rPr lang="en-US" b="1"/>
+              <a:t>Tasks</a:t>
+            </a:r>
+            <a:r>
+              <a:rPr lang="en-US" dirty="0"/>
+              <a:t>)</a:t>
             </a:r>
           </a:p>
         </p:txBody>
@@ -8584,7 +8771,7 @@
         </p:nvSpPr>
         <p:spPr>
           <a:xfrm>
-            <a:off x="2662238" y="5376863"/>
+            <a:off x="2662238" y="5753766"/>
             <a:ext cx="1849437" cy="912812"/>
           </a:xfrm>
           <a:prstGeom prst="roundRect">
@@ -8626,6 +8813,28 @@
           <a:p>
             <a:pPr algn="ctr"/>
             <a:r>
+              <a:rPr lang="en-US">
+                <a:solidFill>
+                  <a:schemeClr val="tx1">
+                    <a:lumMod val="95000"/>
+                    <a:lumOff val="5000"/>
+                  </a:schemeClr>
+                </a:solidFill>
+              </a:rPr>
+              <a:t>New Workitem: </a:t>
+            </a:r>
+            <a:r>
+              <a:rPr lang="en-US" b="1">
+                <a:solidFill>
+                  <a:schemeClr val="tx1">
+                    <a:lumMod val="95000"/>
+                    <a:lumOff val="5000"/>
+                  </a:schemeClr>
+                </a:solidFill>
+              </a:rPr>
+              <a:t>Issue </a:t>
+            </a:r>
+            <a:r>
               <a:rPr lang="en-US" dirty="0">
                 <a:solidFill>
                   <a:schemeClr val="tx1">
@@ -8634,7 +8843,7 @@
                   </a:schemeClr>
                 </a:solidFill>
               </a:rPr>
-              <a:t>Issue C1</a:t>
+              <a:t>C1</a:t>
             </a:r>
           </a:p>
         </p:txBody>
@@ -8653,7 +8862,7 @@
         </p:nvSpPr>
         <p:spPr>
           <a:xfrm>
-            <a:off x="4813298" y="5376863"/>
+            <a:off x="4813298" y="5753766"/>
             <a:ext cx="1849437" cy="912812"/>
           </a:xfrm>
           <a:prstGeom prst="roundRect">
@@ -8695,6 +8904,17 @@
           <a:p>
             <a:pPr algn="ctr"/>
             <a:r>
+              <a:rPr lang="en-US">
+                <a:solidFill>
+                  <a:schemeClr val="tx1">
+                    <a:lumMod val="95000"/>
+                    <a:lumOff val="5000"/>
+                  </a:schemeClr>
+                </a:solidFill>
+              </a:rPr>
+              <a:t>New Workitem:</a:t>
+            </a:r>
+            <a:br>
               <a:rPr lang="en-US" dirty="0">
                 <a:solidFill>
                   <a:schemeClr val="tx1">
@@ -8703,7 +8923,28 @@
                   </a:schemeClr>
                 </a:solidFill>
               </a:rPr>
-              <a:t>Issue C2</a:t>
+            </a:br>
+            <a:r>
+              <a:rPr lang="en-US" b="1">
+                <a:solidFill>
+                  <a:schemeClr val="tx1">
+                    <a:lumMod val="95000"/>
+                    <a:lumOff val="5000"/>
+                  </a:schemeClr>
+                </a:solidFill>
+              </a:rPr>
+              <a:t>Issue </a:t>
+            </a:r>
+            <a:r>
+              <a:rPr lang="en-US" dirty="0">
+                <a:solidFill>
+                  <a:schemeClr val="tx1">
+                    <a:lumMod val="95000"/>
+                    <a:lumOff val="5000"/>
+                  </a:schemeClr>
+                </a:solidFill>
+              </a:rPr>
+              <a:t>C2</a:t>
             </a:r>
           </a:p>
         </p:txBody>
@@ -8722,7 +8963,7 @@
         </p:nvSpPr>
         <p:spPr>
           <a:xfrm>
-            <a:off x="6964361" y="5376863"/>
+            <a:off x="6964361" y="5753766"/>
             <a:ext cx="1849437" cy="912812"/>
           </a:xfrm>
           <a:prstGeom prst="roundRect">
@@ -8764,6 +9005,28 @@
           <a:p>
             <a:pPr algn="ctr"/>
             <a:r>
+              <a:rPr lang="en-US">
+                <a:solidFill>
+                  <a:schemeClr val="tx1">
+                    <a:lumMod val="95000"/>
+                    <a:lumOff val="5000"/>
+                  </a:schemeClr>
+                </a:solidFill>
+              </a:rPr>
+              <a:t>New Workitem: </a:t>
+            </a:r>
+            <a:r>
+              <a:rPr lang="en-US" b="1">
+                <a:solidFill>
+                  <a:schemeClr val="tx1">
+                    <a:lumMod val="95000"/>
+                    <a:lumOff val="5000"/>
+                  </a:schemeClr>
+                </a:solidFill>
+              </a:rPr>
+              <a:t>Issue </a:t>
+            </a:r>
+            <a:r>
               <a:rPr lang="en-US" dirty="0">
                 <a:solidFill>
                   <a:schemeClr val="tx1">
@@ -8772,7 +9035,7 @@
                   </a:schemeClr>
                 </a:solidFill>
               </a:rPr>
-              <a:t>Issue D1</a:t>
+              <a:t>D1</a:t>
             </a:r>
           </a:p>
         </p:txBody>
@@ -8791,7 +9054,7 @@
         </p:nvSpPr>
         <p:spPr>
           <a:xfrm>
-            <a:off x="550862" y="4051300"/>
+            <a:off x="550862" y="4428203"/>
             <a:ext cx="1849437" cy="912812"/>
           </a:xfrm>
           <a:prstGeom prst="roundRect">
@@ -8834,7 +9097,27 @@
             <a:pPr algn="ctr"/>
             <a:r>
               <a:rPr lang="en-US" dirty="0"/>
-              <a:t>Programming Task A (Can Have Issues)</a:t>
+              <a:t>Programming </a:t>
+            </a:r>
+            <a:r>
+              <a:rPr lang="en-US" b="1" dirty="0"/>
+              <a:t>Task </a:t>
+            </a:r>
+            <a:r>
+              <a:rPr lang="en-US"/>
+              <a:t>N (Can </a:t>
+            </a:r>
+            <a:r>
+              <a:rPr lang="en-US" dirty="0"/>
+              <a:t>Have </a:t>
+            </a:r>
+            <a:r>
+              <a:rPr lang="en-US" b="1" dirty="0"/>
+              <a:t>Issues</a:t>
+            </a:r>
+            <a:r>
+              <a:rPr lang="en-US" dirty="0"/>
+              <a:t>)</a:t>
             </a:r>
           </a:p>
         </p:txBody>
@@ -8853,7 +9136,7 @@
         </p:nvSpPr>
         <p:spPr>
           <a:xfrm>
-            <a:off x="2686050" y="4051300"/>
+            <a:off x="2686050" y="4428203"/>
             <a:ext cx="1849437" cy="912812"/>
           </a:xfrm>
           <a:prstGeom prst="roundRect">
@@ -8895,8 +9178,27 @@
           <a:p>
             <a:pPr algn="ctr"/>
             <a:r>
-              <a:rPr lang="en-US" dirty="0"/>
-              <a:t>Programming Task B (Can Have Issues)</a:t>
+              <a:rPr lang="en-US"/>
+              <a:t>Testing </a:t>
+            </a:r>
+            <a:br>
+              <a:rPr lang="en-US" dirty="0"/>
+            </a:br>
+            <a:r>
+              <a:rPr lang="en-US" b="1"/>
+              <a:t>Task M</a:t>
+            </a:r>
+            <a:r>
+              <a:rPr lang="en-US" dirty="0"/>
+              <a:t> (Can Have </a:t>
+            </a:r>
+            <a:r>
+              <a:rPr lang="en-US" b="1" dirty="0"/>
+              <a:t>Issues</a:t>
+            </a:r>
+            <a:r>
+              <a:rPr lang="en-US" dirty="0"/>
+              <a:t>)</a:t>
             </a:r>
           </a:p>
         </p:txBody>
@@ -8915,7 +9217,7 @@
         </p:nvSpPr>
         <p:spPr>
           <a:xfrm>
-            <a:off x="8940800" y="4051300"/>
+            <a:off x="8940800" y="4428203"/>
             <a:ext cx="2825749" cy="920749"/>
           </a:xfrm>
           <a:prstGeom prst="roundRect">
@@ -8958,7 +9260,27 @@
             <a:pPr algn="ctr"/>
             <a:r>
               <a:rPr lang="en-US" dirty="0"/>
-              <a:t>Programming Task E (Can Have Issues)</a:t>
+              <a:t>Programming </a:t>
+            </a:r>
+            <a:r>
+              <a:rPr lang="en-US" b="1" dirty="0"/>
+              <a:t>Task </a:t>
+            </a:r>
+            <a:r>
+              <a:rPr lang="en-US"/>
+              <a:t>M (Can </a:t>
+            </a:r>
+            <a:r>
+              <a:rPr lang="en-US" dirty="0"/>
+              <a:t>Have </a:t>
+            </a:r>
+            <a:r>
+              <a:rPr lang="en-US" b="1" dirty="0"/>
+              <a:t>Issues</a:t>
+            </a:r>
+            <a:r>
+              <a:rPr lang="en-US" dirty="0"/>
+              <a:t>)</a:t>
             </a:r>
           </a:p>
         </p:txBody>
@@ -8977,7 +9299,7 @@
         </p:nvCxnSpPr>
         <p:spPr>
           <a:xfrm flipH="1">
-            <a:off x="4481513" y="4940300"/>
+            <a:off x="4481513" y="5317203"/>
             <a:ext cx="942975" cy="485775"/>
           </a:xfrm>
           <a:prstGeom prst="straightConnector1">
@@ -9024,7 +9346,7 @@
         </p:nvCxnSpPr>
         <p:spPr>
           <a:xfrm flipH="1">
-            <a:off x="5656263" y="4972050"/>
+            <a:off x="5656263" y="5348953"/>
             <a:ext cx="6349" cy="398463"/>
           </a:xfrm>
           <a:prstGeom prst="straightConnector1">
@@ -9071,7 +9393,7 @@
         </p:nvCxnSpPr>
         <p:spPr>
           <a:xfrm>
-            <a:off x="7789874" y="4972575"/>
+            <a:off x="7789874" y="5349478"/>
             <a:ext cx="1587" cy="398461"/>
           </a:xfrm>
           <a:prstGeom prst="straightConnector1">
@@ -9116,7 +9438,7 @@
         </p:nvSpPr>
         <p:spPr>
           <a:xfrm>
-            <a:off x="3175" y="2701925"/>
+            <a:off x="3175" y="3078828"/>
             <a:ext cx="12191999" cy="515937"/>
           </a:xfrm>
           <a:prstGeom prst="rect">
@@ -9154,16 +9476,51 @@
           </a:fontRef>
         </p:style>
         <p:txBody>
-          <a:bodyPr rtlCol="0" anchor="ctr"/>
+          <a:bodyPr lIns="91440" tIns="45720" rIns="91440" bIns="45720" rtlCol="0" anchor="ctr"/>
           <a:lstStyle/>
           <a:p>
             <a:pPr algn="ctr"/>
+            <a:r>
+              <a:rPr lang="en-US" b="1" dirty="0">
+                <a:ea typeface="+mn-lt"/>
+                <a:cs typeface="+mn-lt"/>
+              </a:rPr>
+              <a:t>Epic </a:t>
+            </a:r>
             <a:r>
               <a:rPr lang="en-US" dirty="0">
                 <a:ea typeface="+mn-lt"/>
                 <a:cs typeface="+mn-lt"/>
               </a:rPr>
-              <a:t>Epic A (Has Sprints, Tasks and Issues)</a:t>
+              <a:t>A (Has Sprints, </a:t>
+            </a:r>
+            <a:r>
+              <a:rPr lang="en-US" b="1" dirty="0">
+                <a:ea typeface="+mn-lt"/>
+                <a:cs typeface="+mn-lt"/>
+              </a:rPr>
+              <a:t>Tasks </a:t>
+            </a:r>
+            <a:r>
+              <a:rPr lang="en-US" dirty="0">
+                <a:ea typeface="+mn-lt"/>
+                <a:cs typeface="+mn-lt"/>
+              </a:rPr>
+              <a:t>and </a:t>
+            </a:r>
+            <a:r>
+              <a:rPr lang="en-US" b="1" dirty="0">
+                <a:ea typeface="+mn-lt"/>
+                <a:cs typeface="+mn-lt"/>
+              </a:rPr>
+              <a:t>Issues</a:t>
+            </a:r>
+            <a:r>
+              <a:rPr lang="en-US" dirty="0">
+                <a:ea typeface="+mn-lt"/>
+                <a:cs typeface="+mn-lt"/>
+              </a:rPr>
+              <a:t>)</a:t>
             </a:r>
             <a:endParaRPr lang="en-US" dirty="0"/>
           </a:p>
@@ -9183,7 +9540,7 @@
         </p:nvSpPr>
         <p:spPr>
           <a:xfrm>
-            <a:off x="3175" y="1979611"/>
+            <a:off x="3175" y="2356514"/>
             <a:ext cx="12191999" cy="515937"/>
           </a:xfrm>
           <a:prstGeom prst="rect">
@@ -9226,11 +9583,140 @@
           <a:p>
             <a:pPr algn="ctr"/>
             <a:r>
-              <a:rPr lang="en-US" dirty="0">
+              <a:rPr lang="en-US">
                 <a:ea typeface="+mn-lt"/>
                 <a:cs typeface="+mn-lt"/>
               </a:rPr>
-              <a:t>AZURE DEV/OPS BOARDS (Have Epics, Sprints, Tasks and Issues)</a:t>
+              <a:t>AZURE DEV/OPS BOARDS (Have </a:t>
+            </a:r>
+            <a:r>
+              <a:rPr lang="en-US" b="1">
+                <a:ea typeface="+mn-lt"/>
+                <a:cs typeface="+mn-lt"/>
+              </a:rPr>
+              <a:t>Epics</a:t>
+            </a:r>
+            <a:r>
+              <a:rPr lang="en-US">
+                <a:ea typeface="+mn-lt"/>
+                <a:cs typeface="+mn-lt"/>
+              </a:rPr>
+              <a:t>, Sprints, </a:t>
+            </a:r>
+            <a:r>
+              <a:rPr lang="en-US" b="1">
+                <a:ea typeface="+mn-lt"/>
+                <a:cs typeface="+mn-lt"/>
+              </a:rPr>
+              <a:t>Tasks </a:t>
+            </a:r>
+            <a:r>
+              <a:rPr lang="en-US">
+                <a:ea typeface="+mn-lt"/>
+                <a:cs typeface="+mn-lt"/>
+              </a:rPr>
+              <a:t>and </a:t>
+            </a:r>
+            <a:r>
+              <a:rPr lang="en-US" b="1">
+                <a:ea typeface="+mn-lt"/>
+                <a:cs typeface="+mn-lt"/>
+              </a:rPr>
+              <a:t>Issues </a:t>
+            </a:r>
+            <a:r>
+              <a:rPr lang="en-US">
+                <a:ea typeface="+mn-lt"/>
+                <a:cs typeface="+mn-lt"/>
+              </a:rPr>
+              <a:t>for a Project)</a:t>
+            </a:r>
+            <a:endParaRPr lang="en-US"/>
+          </a:p>
+        </p:txBody>
+      </p:sp>
+      <p:sp>
+        <p:nvSpPr>
+          <p:cNvPr id="6" name="TextBox 5">
+            <a:extLst>
+              <a:ext uri="{FF2B5EF4-FFF2-40B4-BE49-F238E27FC236}">
+                <a16:creationId xmlns:a16="http://schemas.microsoft.com/office/drawing/2014/main" id="{B8799499-7E74-42F6-AFCF-521483CBC828}"/>
+              </a:ext>
+            </a:extLst>
+          </p:cNvPr>
+          <p:cNvSpPr txBox="1"/>
+          <p:nvPr/>
+        </p:nvSpPr>
+        <p:spPr>
+          <a:xfrm>
+            <a:off x="307" y="1786500"/>
+            <a:ext cx="12067457" cy="369332"/>
+          </a:xfrm>
+          <a:prstGeom prst="rect">
+            <a:avLst/>
+          </a:prstGeom>
+          <a:noFill/>
+        </p:spPr>
+        <p:txBody>
+          <a:bodyPr rot="0" spcFirstLastPara="0" vertOverflow="overflow" horzOverflow="overflow" vert="horz" wrap="square" lIns="91440" tIns="45720" rIns="91440" bIns="45720" numCol="1" spcCol="0" rtlCol="0" fromWordArt="0" anchor="t" anchorCtr="0" forceAA="0" compatLnSpc="1">
+            <a:prstTxWarp prst="textNoShape">
+              <a:avLst/>
+            </a:prstTxWarp>
+            <a:spAutoFit/>
+          </a:bodyPr>
+          <a:lstStyle/>
+          <a:p>
+            <a:r>
+              <a:rPr lang="en-US" dirty="0"/>
+              <a:t>A </a:t>
+            </a:r>
+            <a:r>
+              <a:rPr lang="en-US" b="1" dirty="0"/>
+              <a:t>NEW </a:t>
+            </a:r>
+            <a:r>
+              <a:rPr lang="en-US" dirty="0"/>
+              <a:t>"</a:t>
+            </a:r>
+            <a:r>
+              <a:rPr lang="en-US" b="1" dirty="0"/>
+              <a:t>WORK ITEM</a:t>
+            </a:r>
+            <a:r>
+              <a:rPr lang="en-US" dirty="0"/>
+              <a:t>" CAN BE EITHER AN "</a:t>
+            </a:r>
+            <a:r>
+              <a:rPr lang="en-US" b="1" dirty="0"/>
+              <a:t>EPIC</a:t>
+            </a:r>
+            <a:r>
+              <a:rPr lang="en-US" dirty="0"/>
+              <a:t>", A "</a:t>
+            </a:r>
+            <a:r>
+              <a:rPr lang="en-US" b="1" dirty="0"/>
+              <a:t>TASK</a:t>
+            </a:r>
+            <a:r>
+              <a:rPr lang="en-US" dirty="0"/>
+              <a:t>", OR AN "</a:t>
+            </a:r>
+            <a:r>
+              <a:rPr lang="en-US" b="1" dirty="0"/>
+              <a:t>ISSUE</a:t>
+            </a:r>
+            <a:r>
+              <a:rPr lang="en-US"/>
+              <a:t>" (I.e. BUG.) </a:t>
+            </a:r>
+            <a:r>
+              <a:rPr lang="en-US" b="1"/>
+              <a:t>SPRINTS </a:t>
+            </a:r>
+            <a:r>
+              <a:rPr lang="en-US"/>
+              <a:t>ARE DEFINED AT PROJECT START</a:t>
             </a:r>
             <a:endParaRPr lang="en-US" dirty="0"/>
           </a:p>

</xml_diff>